<commit_message>
Adding PixelWriter UML Diagram
</commit_message>
<xml_diff>
--- a/doc/session2/UML.pptx
+++ b/doc/session2/UML.pptx
@@ -4552,14 +4552,14 @@
           <p:nvPr>
             <p:extLst>
               <p:ext uri="{D42A27DB-BD31-4B8C-83A1-F6EECF244321}">
-                <p14:modId xmlns:p14="http://schemas.microsoft.com/office/powerpoint/2010/main" val="3354007775"/>
+                <p14:modId xmlns:p14="http://schemas.microsoft.com/office/powerpoint/2010/main" val="1061309354"/>
               </p:ext>
             </p:extLst>
           </p:nvPr>
         </p:nvGraphicFramePr>
         <p:xfrm>
           <a:off x="729861" y="399098"/>
-          <a:ext cx="10732278" cy="6059804"/>
+          <a:ext cx="10732278" cy="5665335"/>
         </p:xfrm>
         <a:graphic>
           <a:graphicData uri="http://schemas.openxmlformats.org/drawingml/2006/table">
@@ -4576,7 +4576,7 @@
                   </a:extLst>
                 </a:gridCol>
               </a:tblGrid>
-              <a:tr h="501014">
+              <a:tr h="424045">
                 <a:tc>
                   <a:txBody>
                     <a:bodyPr/>
@@ -4618,7 +4618,7 @@
                   </a:ext>
                 </a:extLst>
               </a:tr>
-              <a:tr h="1002028">
+              <a:tr h="874427">
                 <a:tc>
                   <a:txBody>
                     <a:bodyPr/>
@@ -4755,7 +4755,7 @@
                   </a:ext>
                 </a:extLst>
               </a:tr>
-              <a:tr h="4308721">
+              <a:tr h="3646787">
                 <a:tc>
                   <a:txBody>
                     <a:bodyPr/>
@@ -4778,7 +4778,7 @@
                           <a:latin typeface="Courier New" panose="02070309020205020404" pitchFamily="49" charset="0"/>
                           <a:cs typeface="Courier New" panose="02070309020205020404" pitchFamily="49" charset="0"/>
                         </a:rPr>
-                        <a:t>PsychrometricCalculator</a:t>
+                        <a:t>PixelWriter</a:t>
                       </a:r>
                       <a:r>
                         <a:rPr lang="fr-FR" dirty="0">
@@ -4806,14 +4806,42 @@
                           <a:latin typeface="Courier New" panose="02070309020205020404" pitchFamily="49" charset="0"/>
                           <a:cs typeface="Courier New" panose="02070309020205020404" pitchFamily="49" charset="0"/>
                         </a:rPr>
-                        <a:t>PsychrometricCalculator</a:t>
-                      </a:r>
-                      <a:r>
-                        <a:rPr lang="fr-FR" dirty="0">
-                          <a:latin typeface="Courier New" panose="02070309020205020404" pitchFamily="49" charset="0"/>
-                          <a:cs typeface="Courier New" panose="02070309020205020404" pitchFamily="49" charset="0"/>
-                        </a:rPr>
-                        <a:t>(t: double, ah: double, p0: double)</a:t>
+                        <a:t>PixelWriter</a:t>
+                      </a:r>
+                      <a:r>
+                        <a:rPr lang="fr-FR" dirty="0">
+                          <a:latin typeface="Courier New" panose="02070309020205020404" pitchFamily="49" charset="0"/>
+                          <a:cs typeface="Courier New" panose="02070309020205020404" pitchFamily="49" charset="0"/>
+                        </a:rPr>
+                        <a:t>(</a:t>
+                      </a:r>
+                      <a:r>
+                        <a:rPr lang="fr-FR" dirty="0" err="1">
+                          <a:latin typeface="Courier New" panose="02070309020205020404" pitchFamily="49" charset="0"/>
+                          <a:cs typeface="Courier New" panose="02070309020205020404" pitchFamily="49" charset="0"/>
+                        </a:rPr>
+                        <a:t>device</a:t>
+                      </a:r>
+                      <a:r>
+                        <a:rPr lang="fr-FR" dirty="0">
+                          <a:latin typeface="Courier New" panose="02070309020205020404" pitchFamily="49" charset="0"/>
+                          <a:cs typeface="Courier New" panose="02070309020205020404" pitchFamily="49" charset="0"/>
+                        </a:rPr>
+                        <a:t>: </a:t>
+                      </a:r>
+                      <a:r>
+                        <a:rPr lang="fr-FR" dirty="0" err="1">
+                          <a:latin typeface="Courier New" panose="02070309020205020404" pitchFamily="49" charset="0"/>
+                          <a:cs typeface="Courier New" panose="02070309020205020404" pitchFamily="49" charset="0"/>
+                        </a:rPr>
+                        <a:t>SenseHat</a:t>
+                      </a:r>
+                      <a:r>
+                        <a:rPr lang="fr-FR" dirty="0">
+                          <a:latin typeface="Courier New" panose="02070309020205020404" pitchFamily="49" charset="0"/>
+                          <a:cs typeface="Courier New" panose="02070309020205020404" pitchFamily="49" charset="0"/>
+                        </a:rPr>
+                        <a:t>*)</a:t>
                       </a:r>
                     </a:p>
                     <a:p>
@@ -4834,7 +4862,7 @@
                           <a:latin typeface="Courier New" panose="02070309020205020404" pitchFamily="49" charset="0"/>
                           <a:cs typeface="Courier New" panose="02070309020205020404" pitchFamily="49" charset="0"/>
                         </a:rPr>
-                        <a:t>PsychrometricCalculator</a:t>
+                        <a:t>PixelWriter</a:t>
                       </a:r>
                       <a:r>
                         <a:rPr lang="fr-FR" dirty="0">
@@ -4904,28 +4932,28 @@
                           <a:latin typeface="Courier New" panose="02070309020205020404" pitchFamily="49" charset="0"/>
                           <a:cs typeface="Courier New" panose="02070309020205020404" pitchFamily="49" charset="0"/>
                         </a:rPr>
-                        <a:t>SetTemperatureRelativeHumidityPressure</a:t>
-                      </a:r>
-                      <a:r>
-                        <a:rPr lang="fr-FR" dirty="0">
-                          <a:latin typeface="Courier New" panose="02070309020205020404" pitchFamily="49" charset="0"/>
-                          <a:cs typeface="Courier New" panose="02070309020205020404" pitchFamily="49" charset="0"/>
-                        </a:rPr>
-                        <a:t>(t: double, </a:t>
-                      </a:r>
-                      <a:r>
-                        <a:rPr lang="fr-FR" dirty="0" err="1">
-                          <a:latin typeface="Courier New" panose="02070309020205020404" pitchFamily="49" charset="0"/>
-                          <a:cs typeface="Courier New" panose="02070309020205020404" pitchFamily="49" charset="0"/>
-                        </a:rPr>
-                        <a:t>rh</a:t>
-                      </a:r>
-                      <a:r>
-                        <a:rPr lang="fr-FR" dirty="0">
-                          <a:latin typeface="Courier New" panose="02070309020205020404" pitchFamily="49" charset="0"/>
-                          <a:cs typeface="Courier New" panose="02070309020205020404" pitchFamily="49" charset="0"/>
-                        </a:rPr>
-                        <a:t>: double, p0: double)</a:t>
+                        <a:t>DisplayPattern</a:t>
+                      </a:r>
+                      <a:r>
+                        <a:rPr lang="fr-FR" dirty="0">
+                          <a:latin typeface="Courier New" panose="02070309020205020404" pitchFamily="49" charset="0"/>
+                          <a:cs typeface="Courier New" panose="02070309020205020404" pitchFamily="49" charset="0"/>
+                        </a:rPr>
+                        <a:t>(pattern: </a:t>
+                      </a:r>
+                      <a:r>
+                        <a:rPr lang="fr-FR" dirty="0" err="1">
+                          <a:latin typeface="Courier New" panose="02070309020205020404" pitchFamily="49" charset="0"/>
+                          <a:cs typeface="Courier New" panose="02070309020205020404" pitchFamily="49" charset="0"/>
+                        </a:rPr>
+                        <a:t>bool</a:t>
+                      </a:r>
+                      <a:r>
+                        <a:rPr lang="fr-FR" dirty="0">
+                          <a:latin typeface="Courier New" panose="02070309020205020404" pitchFamily="49" charset="0"/>
+                          <a:cs typeface="Courier New" panose="02070309020205020404" pitchFamily="49" charset="0"/>
+                        </a:rPr>
+                        <a:t>*)</a:t>
                       </a:r>
                     </a:p>
                     <a:p>
@@ -4946,14 +4974,56 @@
                           <a:latin typeface="Courier New" panose="02070309020205020404" pitchFamily="49" charset="0"/>
                           <a:cs typeface="Courier New" panose="02070309020205020404" pitchFamily="49" charset="0"/>
                         </a:rPr>
-                        <a:t>SetTemperatureAbsolueHumidityPressure</a:t>
-                      </a:r>
-                      <a:r>
-                        <a:rPr lang="fr-FR" dirty="0">
-                          <a:latin typeface="Courier New" panose="02070309020205020404" pitchFamily="49" charset="0"/>
-                          <a:cs typeface="Courier New" panose="02070309020205020404" pitchFamily="49" charset="0"/>
-                        </a:rPr>
-                        <a:t>(t: double, ah: double, p0: double)</a:t>
+                        <a:t>DisplayPattern</a:t>
+                      </a:r>
+                      <a:r>
+                        <a:rPr lang="fr-FR" dirty="0">
+                          <a:latin typeface="Courier New" panose="02070309020205020404" pitchFamily="49" charset="0"/>
+                          <a:cs typeface="Courier New" panose="02070309020205020404" pitchFamily="49" charset="0"/>
+                        </a:rPr>
+                        <a:t>(pattern: std::</a:t>
+                      </a:r>
+                      <a:r>
+                        <a:rPr lang="fr-FR" dirty="0" err="1">
+                          <a:latin typeface="Courier New" panose="02070309020205020404" pitchFamily="49" charset="0"/>
+                          <a:cs typeface="Courier New" panose="02070309020205020404" pitchFamily="49" charset="0"/>
+                        </a:rPr>
+                        <a:t>vector</a:t>
+                      </a:r>
+                      <a:r>
+                        <a:rPr lang="fr-FR" dirty="0">
+                          <a:latin typeface="Courier New" panose="02070309020205020404" pitchFamily="49" charset="0"/>
+                          <a:cs typeface="Courier New" panose="02070309020205020404" pitchFamily="49" charset="0"/>
+                        </a:rPr>
+                        <a:t>&lt;std::</a:t>
+                      </a:r>
+                      <a:r>
+                        <a:rPr lang="fr-FR" dirty="0" err="1">
+                          <a:latin typeface="Courier New" panose="02070309020205020404" pitchFamily="49" charset="0"/>
+                          <a:cs typeface="Courier New" panose="02070309020205020404" pitchFamily="49" charset="0"/>
+                        </a:rPr>
+                        <a:t>vector</a:t>
+                      </a:r>
+                      <a:r>
+                        <a:rPr lang="fr-FR" dirty="0">
+                          <a:latin typeface="Courier New" panose="02070309020205020404" pitchFamily="49" charset="0"/>
+                          <a:cs typeface="Courier New" panose="02070309020205020404" pitchFamily="49" charset="0"/>
+                        </a:rPr>
+                        <a:t>&lt;</a:t>
+                      </a:r>
+                      <a:r>
+                        <a:rPr lang="fr-FR" dirty="0" err="1">
+                          <a:latin typeface="Courier New" panose="02070309020205020404" pitchFamily="49" charset="0"/>
+                          <a:cs typeface="Courier New" panose="02070309020205020404" pitchFamily="49" charset="0"/>
+                        </a:rPr>
+                        <a:t>bool</a:t>
+                      </a:r>
+                      <a:r>
+                        <a:rPr lang="fr-FR" dirty="0">
+                          <a:latin typeface="Courier New" panose="02070309020205020404" pitchFamily="49" charset="0"/>
+                          <a:cs typeface="Courier New" panose="02070309020205020404" pitchFamily="49" charset="0"/>
+                        </a:rPr>
+                        <a:t>&gt; &gt;&amp;)</a:t>
                       </a:r>
                     </a:p>
                     <a:p>
@@ -4974,14 +5044,42 @@
                           <a:latin typeface="Courier New" panose="02070309020205020404" pitchFamily="49" charset="0"/>
                           <a:cs typeface="Courier New" panose="02070309020205020404" pitchFamily="49" charset="0"/>
                         </a:rPr>
-                        <a:t>GetDryTemperature</a:t>
-                      </a:r>
-                      <a:r>
-                        <a:rPr lang="fr-FR" dirty="0">
-                          <a:latin typeface="Courier New" panose="02070309020205020404" pitchFamily="49" charset="0"/>
-                          <a:cs typeface="Courier New" panose="02070309020205020404" pitchFamily="49" charset="0"/>
-                        </a:rPr>
-                        <a:t>(): double</a:t>
+                        <a:t>SetForecolor</a:t>
+                      </a:r>
+                      <a:r>
+                        <a:rPr lang="fr-FR" dirty="0">
+                          <a:latin typeface="Courier New" panose="02070309020205020404" pitchFamily="49" charset="0"/>
+                          <a:cs typeface="Courier New" panose="02070309020205020404" pitchFamily="49" charset="0"/>
+                        </a:rPr>
+                        <a:t>(</a:t>
+                      </a:r>
+                      <a:r>
+                        <a:rPr lang="fr-FR" dirty="0" err="1">
+                          <a:latin typeface="Courier New" panose="02070309020205020404" pitchFamily="49" charset="0"/>
+                          <a:cs typeface="Courier New" panose="02070309020205020404" pitchFamily="49" charset="0"/>
+                        </a:rPr>
+                        <a:t>forecolor</a:t>
+                      </a:r>
+                      <a:r>
+                        <a:rPr lang="fr-FR" dirty="0">
+                          <a:latin typeface="Courier New" panose="02070309020205020404" pitchFamily="49" charset="0"/>
+                          <a:cs typeface="Courier New" panose="02070309020205020404" pitchFamily="49" charset="0"/>
+                        </a:rPr>
+                        <a:t>: </a:t>
+                      </a:r>
+                      <a:r>
+                        <a:rPr lang="fr-FR" dirty="0" err="1">
+                          <a:latin typeface="Courier New" panose="02070309020205020404" pitchFamily="49" charset="0"/>
+                          <a:cs typeface="Courier New" panose="02070309020205020404" pitchFamily="49" charset="0"/>
+                        </a:rPr>
+                        <a:t>Color_t</a:t>
+                      </a:r>
+                      <a:r>
+                        <a:rPr lang="fr-FR" dirty="0">
+                          <a:latin typeface="Courier New" panose="02070309020205020404" pitchFamily="49" charset="0"/>
+                          <a:cs typeface="Courier New" panose="02070309020205020404" pitchFamily="49" charset="0"/>
+                        </a:rPr>
+                        <a:t>)</a:t>
                       </a:r>
                     </a:p>
                     <a:p>
@@ -5002,14 +5100,42 @@
                           <a:latin typeface="Courier New" panose="02070309020205020404" pitchFamily="49" charset="0"/>
                           <a:cs typeface="Courier New" panose="02070309020205020404" pitchFamily="49" charset="0"/>
                         </a:rPr>
-                        <a:t>GetTemperature</a:t>
-                      </a:r>
-                      <a:r>
-                        <a:rPr lang="fr-FR" dirty="0">
-                          <a:latin typeface="Courier New" panose="02070309020205020404" pitchFamily="49" charset="0"/>
-                          <a:cs typeface="Courier New" panose="02070309020205020404" pitchFamily="49" charset="0"/>
-                        </a:rPr>
-                        <a:t>(): double</a:t>
+                        <a:t>SetBackcolor</a:t>
+                      </a:r>
+                      <a:r>
+                        <a:rPr lang="fr-FR" dirty="0">
+                          <a:latin typeface="Courier New" panose="02070309020205020404" pitchFamily="49" charset="0"/>
+                          <a:cs typeface="Courier New" panose="02070309020205020404" pitchFamily="49" charset="0"/>
+                        </a:rPr>
+                        <a:t>(</a:t>
+                      </a:r>
+                      <a:r>
+                        <a:rPr lang="fr-FR" dirty="0" err="1">
+                          <a:latin typeface="Courier New" panose="02070309020205020404" pitchFamily="49" charset="0"/>
+                          <a:cs typeface="Courier New" panose="02070309020205020404" pitchFamily="49" charset="0"/>
+                        </a:rPr>
+                        <a:t>backcolor</a:t>
+                      </a:r>
+                      <a:r>
+                        <a:rPr lang="fr-FR" dirty="0">
+                          <a:latin typeface="Courier New" panose="02070309020205020404" pitchFamily="49" charset="0"/>
+                          <a:cs typeface="Courier New" panose="02070309020205020404" pitchFamily="49" charset="0"/>
+                        </a:rPr>
+                        <a:t>: </a:t>
+                      </a:r>
+                      <a:r>
+                        <a:rPr lang="fr-FR" dirty="0" err="1">
+                          <a:latin typeface="Courier New" panose="02070309020205020404" pitchFamily="49" charset="0"/>
+                          <a:cs typeface="Courier New" panose="02070309020205020404" pitchFamily="49" charset="0"/>
+                        </a:rPr>
+                        <a:t>Color_t</a:t>
+                      </a:r>
+                      <a:r>
+                        <a:rPr lang="fr-FR" dirty="0">
+                          <a:latin typeface="Courier New" panose="02070309020205020404" pitchFamily="49" charset="0"/>
+                          <a:cs typeface="Courier New" panose="02070309020205020404" pitchFamily="49" charset="0"/>
+                        </a:rPr>
+                        <a:t>)</a:t>
                       </a:r>
                     </a:p>
                     <a:p>
@@ -5030,15 +5156,26 @@
                           <a:latin typeface="Courier New" panose="02070309020205020404" pitchFamily="49" charset="0"/>
                           <a:cs typeface="Courier New" panose="02070309020205020404" pitchFamily="49" charset="0"/>
                         </a:rPr>
-                        <a:t>GetAbsoluteHumidity</a:t>
-                      </a:r>
-                      <a:r>
-                        <a:rPr lang="fr-FR" dirty="0">
-                          <a:latin typeface="Courier New" panose="02070309020205020404" pitchFamily="49" charset="0"/>
-                          <a:cs typeface="Courier New" panose="02070309020205020404" pitchFamily="49" charset="0"/>
-                        </a:rPr>
-                        <a:t>(): double</a:t>
-                      </a:r>
+                        <a:t>GetForecolor</a:t>
+                      </a:r>
+                      <a:r>
+                        <a:rPr lang="fr-FR" dirty="0">
+                          <a:latin typeface="Courier New" panose="02070309020205020404" pitchFamily="49" charset="0"/>
+                          <a:cs typeface="Courier New" panose="02070309020205020404" pitchFamily="49" charset="0"/>
+                        </a:rPr>
+                        <a:t>(): </a:t>
+                      </a:r>
+                      <a:r>
+                        <a:rPr lang="fr-FR" dirty="0" err="1">
+                          <a:latin typeface="Courier New" panose="02070309020205020404" pitchFamily="49" charset="0"/>
+                          <a:cs typeface="Courier New" panose="02070309020205020404" pitchFamily="49" charset="0"/>
+                        </a:rPr>
+                        <a:t>Color_t</a:t>
+                      </a:r>
+                      <a:endParaRPr lang="fr-FR" dirty="0">
+                        <a:latin typeface="Courier New" panose="02070309020205020404" pitchFamily="49" charset="0"/>
+                        <a:cs typeface="Courier New" panose="02070309020205020404" pitchFamily="49" charset="0"/>
+                      </a:endParaRPr>
                     </a:p>
                     <a:p>
                       <a:pPr algn="l">
@@ -5058,15 +5195,26 @@
                           <a:latin typeface="Courier New" panose="02070309020205020404" pitchFamily="49" charset="0"/>
                           <a:cs typeface="Courier New" panose="02070309020205020404" pitchFamily="49" charset="0"/>
                         </a:rPr>
-                        <a:t>GetVapourPressure</a:t>
-                      </a:r>
-                      <a:r>
-                        <a:rPr lang="fr-FR" dirty="0">
-                          <a:latin typeface="Courier New" panose="02070309020205020404" pitchFamily="49" charset="0"/>
-                          <a:cs typeface="Courier New" panose="02070309020205020404" pitchFamily="49" charset="0"/>
-                        </a:rPr>
-                        <a:t>(): double</a:t>
-                      </a:r>
+                        <a:t>GetBackcolor</a:t>
+                      </a:r>
+                      <a:r>
+                        <a:rPr lang="fr-FR" dirty="0">
+                          <a:latin typeface="Courier New" panose="02070309020205020404" pitchFamily="49" charset="0"/>
+                          <a:cs typeface="Courier New" panose="02070309020205020404" pitchFamily="49" charset="0"/>
+                        </a:rPr>
+                        <a:t>(): </a:t>
+                      </a:r>
+                      <a:r>
+                        <a:rPr lang="fr-FR" dirty="0" err="1">
+                          <a:latin typeface="Courier New" panose="02070309020205020404" pitchFamily="49" charset="0"/>
+                          <a:cs typeface="Courier New" panose="02070309020205020404" pitchFamily="49" charset="0"/>
+                        </a:rPr>
+                        <a:t>Color_t</a:t>
+                      </a:r>
+                      <a:endParaRPr lang="fr-FR" dirty="0">
+                        <a:latin typeface="Courier New" panose="02070309020205020404" pitchFamily="49" charset="0"/>
+                        <a:cs typeface="Courier New" panose="02070309020205020404" pitchFamily="49" charset="0"/>
+                      </a:endParaRPr>
                     </a:p>
                     <a:p>
                       <a:pPr algn="l">
@@ -5086,21 +5234,33 @@
                           <a:latin typeface="Courier New" panose="02070309020205020404" pitchFamily="49" charset="0"/>
                           <a:cs typeface="Courier New" panose="02070309020205020404" pitchFamily="49" charset="0"/>
                         </a:rPr>
-                        <a:t>GetRelativeHumidity</a:t>
-                      </a:r>
-                      <a:r>
-                        <a:rPr lang="fr-FR" dirty="0">
-                          <a:latin typeface="Courier New" panose="02070309020205020404" pitchFamily="49" charset="0"/>
-                          <a:cs typeface="Courier New" panose="02070309020205020404" pitchFamily="49" charset="0"/>
-                        </a:rPr>
-                        <a:t>(): double</a:t>
+                        <a:t>DisplayCharacter</a:t>
+                      </a:r>
+                      <a:r>
+                        <a:rPr lang="fr-FR" dirty="0">
+                          <a:latin typeface="Courier New" panose="02070309020205020404" pitchFamily="49" charset="0"/>
+                          <a:cs typeface="Courier New" panose="02070309020205020404" pitchFamily="49" charset="0"/>
+                        </a:rPr>
+                        <a:t>(c: char)</a:t>
                       </a:r>
                     </a:p>
                     <a:p>
-                      <a:pPr algn="l">
+                      <a:pPr marL="0" marR="0" lvl="0" indent="0" algn="l" defTabSz="914400" rtl="0" eaLnBrk="1" fontAlgn="auto" latinLnBrk="0" hangingPunct="1">
                         <a:lnSpc>
                           <a:spcPts val="2500"/>
                         </a:lnSpc>
+                        <a:spcBef>
+                          <a:spcPts val="0"/>
+                        </a:spcBef>
+                        <a:spcAft>
+                          <a:spcPts val="0"/>
+                        </a:spcAft>
+                        <a:buClrTx/>
+                        <a:buSzTx/>
+                        <a:buFontTx/>
+                        <a:buNone/>
+                        <a:tabLst/>
+                        <a:defRPr/>
                       </a:pPr>
                       <a:r>
                         <a:rPr lang="fr-FR" dirty="0">
@@ -5114,42 +5274,14 @@
                           <a:latin typeface="Courier New" panose="02070309020205020404" pitchFamily="49" charset="0"/>
                           <a:cs typeface="Courier New" panose="02070309020205020404" pitchFamily="49" charset="0"/>
                         </a:rPr>
-                        <a:t>GetSpecificEnthalpy</a:t>
-                      </a:r>
-                      <a:r>
-                        <a:rPr lang="fr-FR" dirty="0">
-                          <a:latin typeface="Courier New" panose="02070309020205020404" pitchFamily="49" charset="0"/>
-                          <a:cs typeface="Courier New" panose="02070309020205020404" pitchFamily="49" charset="0"/>
-                        </a:rPr>
-                        <a:t>(): double</a:t>
-                      </a:r>
-                    </a:p>
-                    <a:p>
-                      <a:pPr algn="l">
-                        <a:lnSpc>
-                          <a:spcPts val="2500"/>
-                        </a:lnSpc>
-                      </a:pPr>
-                      <a:r>
-                        <a:rPr lang="fr-FR" dirty="0">
-                          <a:latin typeface="Courier New" panose="02070309020205020404" pitchFamily="49" charset="0"/>
-                          <a:cs typeface="Courier New" panose="02070309020205020404" pitchFamily="49" charset="0"/>
-                        </a:rPr>
-                        <a:t>+ </a:t>
-                      </a:r>
-                      <a:r>
-                        <a:rPr lang="fr-FR" dirty="0" err="1">
-                          <a:latin typeface="Courier New" panose="02070309020205020404" pitchFamily="49" charset="0"/>
-                          <a:cs typeface="Courier New" panose="02070309020205020404" pitchFamily="49" charset="0"/>
-                        </a:rPr>
-                        <a:t>GetSpecificVolume</a:t>
-                      </a:r>
-                      <a:r>
-                        <a:rPr lang="fr-FR" dirty="0">
-                          <a:latin typeface="Courier New" panose="02070309020205020404" pitchFamily="49" charset="0"/>
-                          <a:cs typeface="Courier New" panose="02070309020205020404" pitchFamily="49" charset="0"/>
-                        </a:rPr>
-                        <a:t>(): double</a:t>
+                        <a:t>DisplaySentence</a:t>
+                      </a:r>
+                      <a:r>
+                        <a:rPr lang="fr-FR" dirty="0">
+                          <a:latin typeface="Courier New" panose="02070309020205020404" pitchFamily="49" charset="0"/>
+                          <a:cs typeface="Courier New" panose="02070309020205020404" pitchFamily="49" charset="0"/>
+                        </a:rPr>
+                        <a:t>(s: std::string)</a:t>
                       </a:r>
                     </a:p>
                   </a:txBody>

</xml_diff>